<commit_message>
Tweak DevOps definition slide
</commit_message>
<xml_diff>
--- a/DevOps in the Cloud.pptx
+++ b/DevOps in the Cloud.pptx
@@ -1871,7 +1871,7 @@
       </dsp:nvSpPr>
       <dsp:spPr>
         <a:xfrm>
-          <a:off x="3952398" y="54391"/>
+          <a:off x="1285398" y="54391"/>
           <a:ext cx="2610802" cy="2610802"/>
         </a:xfrm>
         <a:prstGeom prst="ellipse">
@@ -1939,7 +1939,7 @@
         </a:p>
       </dsp:txBody>
       <dsp:txXfrm>
-        <a:off x="4300505" y="511282"/>
+        <a:off x="1633505" y="511282"/>
         <a:ext cx="1914588" cy="1174861"/>
       </dsp:txXfrm>
     </dsp:sp>
@@ -1950,7 +1950,7 @@
       </dsp:nvSpPr>
       <dsp:spPr>
         <a:xfrm>
-          <a:off x="4894463" y="1686143"/>
+          <a:off x="2227463" y="1686143"/>
           <a:ext cx="2610802" cy="2610802"/>
         </a:xfrm>
         <a:prstGeom prst="ellipse">
@@ -2018,7 +2018,7 @@
         </a:p>
       </dsp:txBody>
       <dsp:txXfrm>
-        <a:off x="5692933" y="2360600"/>
+        <a:off x="3025933" y="2360600"/>
         <a:ext cx="1566481" cy="1435941"/>
       </dsp:txXfrm>
     </dsp:sp>
@@ -2029,7 +2029,7 @@
       </dsp:nvSpPr>
       <dsp:spPr>
         <a:xfrm>
-          <a:off x="3010333" y="1686143"/>
+          <a:off x="343333" y="1686143"/>
           <a:ext cx="2610802" cy="2610802"/>
         </a:xfrm>
         <a:prstGeom prst="ellipse">
@@ -2097,7 +2097,7 @@
         </a:p>
       </dsp:txBody>
       <dsp:txXfrm>
-        <a:off x="3256184" y="2360600"/>
+        <a:off x="589184" y="2360600"/>
         <a:ext cx="1566481" cy="1435941"/>
       </dsp:txXfrm>
     </dsp:sp>
@@ -6472,23 +6472,17 @@
           <a:bodyPr/>
           <a:lstStyle/>
           <a:p>
-            <a:pPr marL="171450" indent="-171450">
+            <a:pPr marL="171450" lvl="0" indent="-171450">
               <a:buFontTx/>
               <a:buChar char="-"/>
             </a:pPr>
             <a:r>
-              <a:rPr lang="en-US" dirty="0"/>
-              <a:t>Union of people, process, &amp; products to enable continuous delivery of value to end users</a:t>
+              <a:rPr lang="en-US"/>
+              <a:t>People </a:t>
             </a:r>
-          </a:p>
-          <a:p>
-            <a:pPr marL="628650" lvl="1" indent="-171450">
-              <a:buFontTx/>
-              <a:buChar char="-"/>
-            </a:pPr>
             <a:r>
               <a:rPr lang="en-US" dirty="0"/>
-              <a:t>Stated a different way: People following a process enabled by products to deliver value to end users</a:t>
+              <a:t>following a process enabled by products to deliver value to end users</a:t>
             </a:r>
           </a:p>
         </p:txBody>
@@ -14729,17 +14723,17 @@
             <a:graphicFrameLocks noGrp="1"/>
           </p:cNvGraphicFramePr>
           <p:nvPr>
-            <p:ph idx="1"/>
+            <p:ph sz="half" idx="1"/>
             <p:extLst>
               <p:ext uri="{D42A27DB-BD31-4B8C-83A1-F6EECF244321}">
-                <p14:modId xmlns:p14="http://schemas.microsoft.com/office/powerpoint/2010/main" val="1232551702"/>
+                <p14:modId xmlns:p14="http://schemas.microsoft.com/office/powerpoint/2010/main" val="892234332"/>
               </p:ext>
             </p:extLst>
           </p:nvPr>
         </p:nvGraphicFramePr>
         <p:xfrm>
           <a:off x="838200" y="1825625"/>
-          <a:ext cx="10515600" cy="4351338"/>
+          <a:ext cx="5181600" cy="4351338"/>
         </p:xfrm>
         <a:graphic>
           <a:graphicData uri="http://schemas.openxmlformats.org/drawingml/2006/diagram">
@@ -14747,6 +14741,777 @@
           </a:graphicData>
         </a:graphic>
       </p:graphicFrame>
+      <p:sp>
+        <p:nvSpPr>
+          <p:cNvPr id="3" name="TextBox 2">
+            <a:extLst>
+              <a:ext uri="{FF2B5EF4-FFF2-40B4-BE49-F238E27FC236}">
+                <a16:creationId xmlns:a16="http://schemas.microsoft.com/office/drawing/2014/main" id="{C2312A35-4D6F-4BBB-B67C-895E9E232FFA}"/>
+              </a:ext>
+            </a:extLst>
+          </p:cNvPr>
+          <p:cNvSpPr txBox="1"/>
+          <p:nvPr/>
+        </p:nvSpPr>
+        <p:spPr>
+          <a:xfrm>
+            <a:off x="2175913" y="1772538"/>
+            <a:ext cx="2446714" cy="1743958"/>
+          </a:xfrm>
+          <a:prstGeom prst="rect">
+            <a:avLst/>
+          </a:prstGeom>
+          <a:noFill/>
+        </p:spPr>
+        <p:txBody>
+          <a:bodyPr wrap="square" rtlCol="0">
+            <a:prstTxWarp prst="textCircle">
+              <a:avLst/>
+            </a:prstTxWarp>
+            <a:spAutoFit/>
+          </a:bodyPr>
+          <a:lstStyle/>
+          <a:p>
+            <a:r>
+              <a:rPr lang="en-US" dirty="0"/>
+              <a:t>Developers, Operations, QA</a:t>
+            </a:r>
+          </a:p>
+        </p:txBody>
+      </p:sp>
+      <p:sp>
+        <p:nvSpPr>
+          <p:cNvPr id="5" name="TextBox 4">
+            <a:extLst>
+              <a:ext uri="{FF2B5EF4-FFF2-40B4-BE49-F238E27FC236}">
+                <a16:creationId xmlns:a16="http://schemas.microsoft.com/office/drawing/2014/main" id="{E448FFDA-AF8E-41D6-A119-CF30821B7757}"/>
+              </a:ext>
+            </a:extLst>
+          </p:cNvPr>
+          <p:cNvSpPr txBox="1"/>
+          <p:nvPr/>
+        </p:nvSpPr>
+        <p:spPr>
+          <a:xfrm rot="5400000">
+            <a:off x="3832810" y="4074804"/>
+            <a:ext cx="2405675" cy="1495068"/>
+          </a:xfrm>
+          <a:prstGeom prst="rect">
+            <a:avLst/>
+          </a:prstGeom>
+          <a:noFill/>
+        </p:spPr>
+        <p:txBody>
+          <a:bodyPr wrap="square" rtlCol="0">
+            <a:prstTxWarp prst="textCircle">
+              <a:avLst/>
+            </a:prstTxWarp>
+            <a:spAutoFit/>
+          </a:bodyPr>
+          <a:lstStyle/>
+          <a:p>
+            <a:r>
+              <a:rPr lang="en-US" dirty="0"/>
+              <a:t>Azure DevOps Services</a:t>
+            </a:r>
+          </a:p>
+        </p:txBody>
+      </p:sp>
+      <p:sp>
+        <p:nvSpPr>
+          <p:cNvPr id="6" name="TextBox 5">
+            <a:extLst>
+              <a:ext uri="{FF2B5EF4-FFF2-40B4-BE49-F238E27FC236}">
+                <a16:creationId xmlns:a16="http://schemas.microsoft.com/office/drawing/2014/main" id="{E7B3B1E0-22A2-4637-9224-87BFFBE7397D}"/>
+              </a:ext>
+            </a:extLst>
+          </p:cNvPr>
+          <p:cNvSpPr txBox="1"/>
+          <p:nvPr/>
+        </p:nvSpPr>
+        <p:spPr>
+          <a:xfrm rot="18824451">
+            <a:off x="862047" y="3548309"/>
+            <a:ext cx="2647691" cy="2091336"/>
+          </a:xfrm>
+          <a:prstGeom prst="rect">
+            <a:avLst/>
+          </a:prstGeom>
+          <a:noFill/>
+        </p:spPr>
+        <p:txBody>
+          <a:bodyPr wrap="square" rtlCol="0">
+            <a:prstTxWarp prst="textCircle">
+              <a:avLst/>
+            </a:prstTxWarp>
+            <a:spAutoFit/>
+          </a:bodyPr>
+          <a:lstStyle/>
+          <a:p>
+            <a:r>
+              <a:rPr lang="en-US" dirty="0"/>
+              <a:t>Continuous Build &amp; Delivery</a:t>
+            </a:r>
+          </a:p>
+        </p:txBody>
+      </p:sp>
+      <p:sp>
+        <p:nvSpPr>
+          <p:cNvPr id="7" name="TextBox 6">
+            <a:extLst>
+              <a:ext uri="{FF2B5EF4-FFF2-40B4-BE49-F238E27FC236}">
+                <a16:creationId xmlns:a16="http://schemas.microsoft.com/office/drawing/2014/main" id="{56A55CAC-2610-475B-9761-16B699995CEF}"/>
+              </a:ext>
+            </a:extLst>
+          </p:cNvPr>
+          <p:cNvSpPr txBox="1"/>
+          <p:nvPr/>
+        </p:nvSpPr>
+        <p:spPr>
+          <a:xfrm>
+            <a:off x="2946678" y="4034298"/>
+            <a:ext cx="964642" cy="369332"/>
+          </a:xfrm>
+          <a:prstGeom prst="rect">
+            <a:avLst/>
+          </a:prstGeom>
+          <a:noFill/>
+        </p:spPr>
+        <p:txBody>
+          <a:bodyPr wrap="square" rtlCol="0">
+            <a:spAutoFit/>
+          </a:bodyPr>
+          <a:lstStyle/>
+          <a:p>
+            <a:r>
+              <a:rPr lang="en-US" b="1" dirty="0"/>
+              <a:t>DevOps</a:t>
+            </a:r>
+          </a:p>
+        </p:txBody>
+      </p:sp>
+      <p:pic>
+        <p:nvPicPr>
+          <p:cNvPr id="1026" name="Picture 2" descr="Donovan Brown">
+            <a:extLst>
+              <a:ext uri="{FF2B5EF4-FFF2-40B4-BE49-F238E27FC236}">
+                <a16:creationId xmlns:a16="http://schemas.microsoft.com/office/drawing/2014/main" id="{E8860BAC-F343-49E8-A76D-07F6AAB06496}"/>
+              </a:ext>
+            </a:extLst>
+          </p:cNvPr>
+          <p:cNvPicPr>
+            <a:picLocks noChangeAspect="1" noChangeArrowheads="1"/>
+          </p:cNvPicPr>
+          <p:nvPr/>
+        </p:nvPicPr>
+        <p:blipFill>
+          <a:blip r:embed="rId8">
+            <a:extLst>
+              <a:ext uri="{28A0092B-C50C-407E-A947-70E740481C1C}">
+                <a14:useLocalDpi xmlns:a14="http://schemas.microsoft.com/office/drawing/2010/main" val="0"/>
+              </a:ext>
+            </a:extLst>
+          </a:blip>
+          <a:srcRect/>
+          <a:stretch>
+            <a:fillRect/>
+          </a:stretch>
+        </p:blipFill>
+        <p:spPr bwMode="auto">
+          <a:xfrm>
+            <a:off x="9646417" y="3152229"/>
+            <a:ext cx="1629508" cy="1629508"/>
+          </a:xfrm>
+          <a:prstGeom prst="ellipse">
+            <a:avLst/>
+          </a:prstGeom>
+          <a:ln>
+            <a:noFill/>
+          </a:ln>
+          <a:effectLst>
+            <a:softEdge rad="112500"/>
+          </a:effectLst>
+          <a:extLst>
+            <a:ext uri="{909E8E84-426E-40DD-AFC4-6F175D3DCCD1}">
+              <a14:hiddenFill xmlns:a14="http://schemas.microsoft.com/office/drawing/2010/main">
+                <a:solidFill>
+                  <a:srgbClr val="FFFFFF"/>
+                </a:solidFill>
+              </a14:hiddenFill>
+            </a:ext>
+          </a:extLst>
+        </p:spPr>
+      </p:pic>
+      <p:sp>
+        <p:nvSpPr>
+          <p:cNvPr id="12" name="Rectangle 11">
+            <a:extLst>
+              <a:ext uri="{FF2B5EF4-FFF2-40B4-BE49-F238E27FC236}">
+                <a16:creationId xmlns:a16="http://schemas.microsoft.com/office/drawing/2014/main" id="{40183298-9CB5-4564-88BB-FE19932405EF}"/>
+              </a:ext>
+            </a:extLst>
+          </p:cNvPr>
+          <p:cNvSpPr/>
+          <p:nvPr/>
+        </p:nvSpPr>
+        <p:spPr>
+          <a:xfrm>
+            <a:off x="5388588" y="2228671"/>
+            <a:ext cx="6343821" cy="1200329"/>
+          </a:xfrm>
+          <a:prstGeom prst="rect">
+            <a:avLst/>
+          </a:prstGeom>
+        </p:spPr>
+        <p:txBody>
+          <a:bodyPr wrap="square">
+            <a:spAutoFit/>
+          </a:bodyPr>
+          <a:lstStyle>
+            <a:defPPr>
+              <a:defRPr lang="fr-FR"/>
+            </a:defPPr>
+            <a:lvl1pPr marL="0" algn="l" defTabSz="914354" rtl="0" eaLnBrk="1" latinLnBrk="0" hangingPunct="1">
+              <a:defRPr sz="1800" kern="1200">
+                <a:solidFill>
+                  <a:schemeClr val="tx1"/>
+                </a:solidFill>
+                <a:latin typeface="+mn-lt"/>
+                <a:ea typeface="+mn-ea"/>
+                <a:cs typeface="+mn-cs"/>
+              </a:defRPr>
+            </a:lvl1pPr>
+            <a:lvl2pPr marL="457178" algn="l" defTabSz="914354" rtl="0" eaLnBrk="1" latinLnBrk="0" hangingPunct="1">
+              <a:defRPr sz="1800" kern="1200">
+                <a:solidFill>
+                  <a:schemeClr val="tx1"/>
+                </a:solidFill>
+                <a:latin typeface="+mn-lt"/>
+                <a:ea typeface="+mn-ea"/>
+                <a:cs typeface="+mn-cs"/>
+              </a:defRPr>
+            </a:lvl2pPr>
+            <a:lvl3pPr marL="914354" algn="l" defTabSz="914354" rtl="0" eaLnBrk="1" latinLnBrk="0" hangingPunct="1">
+              <a:defRPr sz="1800" kern="1200">
+                <a:solidFill>
+                  <a:schemeClr val="tx1"/>
+                </a:solidFill>
+                <a:latin typeface="+mn-lt"/>
+                <a:ea typeface="+mn-ea"/>
+                <a:cs typeface="+mn-cs"/>
+              </a:defRPr>
+            </a:lvl3pPr>
+            <a:lvl4pPr marL="1371532" algn="l" defTabSz="914354" rtl="0" eaLnBrk="1" latinLnBrk="0" hangingPunct="1">
+              <a:defRPr sz="1800" kern="1200">
+                <a:solidFill>
+                  <a:schemeClr val="tx1"/>
+                </a:solidFill>
+                <a:latin typeface="+mn-lt"/>
+                <a:ea typeface="+mn-ea"/>
+                <a:cs typeface="+mn-cs"/>
+              </a:defRPr>
+            </a:lvl4pPr>
+            <a:lvl5pPr marL="1828709" algn="l" defTabSz="914354" rtl="0" eaLnBrk="1" latinLnBrk="0" hangingPunct="1">
+              <a:defRPr sz="1800" kern="1200">
+                <a:solidFill>
+                  <a:schemeClr val="tx1"/>
+                </a:solidFill>
+                <a:latin typeface="+mn-lt"/>
+                <a:ea typeface="+mn-ea"/>
+                <a:cs typeface="+mn-cs"/>
+              </a:defRPr>
+            </a:lvl5pPr>
+            <a:lvl6pPr marL="2285886" algn="l" defTabSz="914354" rtl="0" eaLnBrk="1" latinLnBrk="0" hangingPunct="1">
+              <a:defRPr sz="1800" kern="1200">
+                <a:solidFill>
+                  <a:schemeClr val="tx1"/>
+                </a:solidFill>
+                <a:latin typeface="+mn-lt"/>
+                <a:ea typeface="+mn-ea"/>
+                <a:cs typeface="+mn-cs"/>
+              </a:defRPr>
+            </a:lvl6pPr>
+            <a:lvl7pPr marL="2743062" algn="l" defTabSz="914354" rtl="0" eaLnBrk="1" latinLnBrk="0" hangingPunct="1">
+              <a:defRPr sz="1800" kern="1200">
+                <a:solidFill>
+                  <a:schemeClr val="tx1"/>
+                </a:solidFill>
+                <a:latin typeface="+mn-lt"/>
+                <a:ea typeface="+mn-ea"/>
+                <a:cs typeface="+mn-cs"/>
+              </a:defRPr>
+            </a:lvl7pPr>
+            <a:lvl8pPr marL="3200240" algn="l" defTabSz="914354" rtl="0" eaLnBrk="1" latinLnBrk="0" hangingPunct="1">
+              <a:defRPr sz="1800" kern="1200">
+                <a:solidFill>
+                  <a:schemeClr val="tx1"/>
+                </a:solidFill>
+                <a:latin typeface="+mn-lt"/>
+                <a:ea typeface="+mn-ea"/>
+                <a:cs typeface="+mn-cs"/>
+              </a:defRPr>
+            </a:lvl8pPr>
+            <a:lvl9pPr marL="3657418" algn="l" defTabSz="914354" rtl="0" eaLnBrk="1" latinLnBrk="0" hangingPunct="1">
+              <a:defRPr sz="1800" kern="1200">
+                <a:solidFill>
+                  <a:schemeClr val="tx1"/>
+                </a:solidFill>
+                <a:latin typeface="+mn-lt"/>
+                <a:ea typeface="+mn-ea"/>
+                <a:cs typeface="+mn-cs"/>
+              </a:defRPr>
+            </a:lvl9pPr>
+          </a:lstStyle>
+          <a:p>
+            <a:r>
+              <a:rPr lang="en-US" sz="2400" dirty="0"/>
+              <a:t>…the union of people, process, and products to enable continuous delivery of value to our end users. </a:t>
+            </a:r>
+            <a:r>
+              <a:rPr lang="en-US" sz="2400" b="1" dirty="0"/>
+              <a:t>– Donovan Brown, Microsoft</a:t>
+            </a:r>
+          </a:p>
+        </p:txBody>
+      </p:sp>
+      <p:grpSp>
+        <p:nvGrpSpPr>
+          <p:cNvPr id="13" name="Group 12">
+            <a:extLst>
+              <a:ext uri="{FF2B5EF4-FFF2-40B4-BE49-F238E27FC236}">
+                <a16:creationId xmlns:a16="http://schemas.microsoft.com/office/drawing/2014/main" id="{9030E3C5-3B46-4B96-9163-782A3A0D4DDB}"/>
+              </a:ext>
+            </a:extLst>
+          </p:cNvPr>
+          <p:cNvGrpSpPr/>
+          <p:nvPr/>
+        </p:nvGrpSpPr>
+        <p:grpSpPr>
+          <a:xfrm>
+            <a:off x="5232841" y="1243474"/>
+            <a:ext cx="946967" cy="1036600"/>
+            <a:chOff x="4360803" y="1688277"/>
+            <a:chExt cx="1169762" cy="1013297"/>
+          </a:xfrm>
+          <a:solidFill>
+            <a:sysClr val="window" lastClr="FFFFFF">
+              <a:alpha val="30000"/>
+            </a:sysClr>
+          </a:solidFill>
+        </p:grpSpPr>
+        <p:sp>
+          <p:nvSpPr>
+            <p:cNvPr id="14" name="Freeform: Shape 13">
+              <a:extLst>
+                <a:ext uri="{FF2B5EF4-FFF2-40B4-BE49-F238E27FC236}">
+                  <a16:creationId xmlns:a16="http://schemas.microsoft.com/office/drawing/2014/main" id="{FD0AA3AF-6A86-4D9B-BEBF-E438B89C1B36}"/>
+                </a:ext>
+              </a:extLst>
+            </p:cNvPr>
+            <p:cNvSpPr/>
+            <p:nvPr/>
+          </p:nvSpPr>
+          <p:spPr>
+            <a:xfrm>
+              <a:off x="4360803" y="1688277"/>
+              <a:ext cx="540177" cy="1013297"/>
+            </a:xfrm>
+            <a:custGeom>
+              <a:avLst/>
+              <a:gdLst/>
+              <a:ahLst/>
+              <a:cxnLst/>
+              <a:rect l="l" t="t" r="r" b="b"/>
+              <a:pathLst>
+                <a:path w="540177" h="1013297">
+                  <a:moveTo>
+                    <a:pt x="423449" y="0"/>
+                  </a:moveTo>
+                  <a:lnTo>
+                    <a:pt x="540177" y="221038"/>
+                  </a:lnTo>
+                  <a:cubicBezTo>
+                    <a:pt x="444973" y="265742"/>
+                    <a:pt x="379159" y="310239"/>
+                    <a:pt x="342733" y="354530"/>
+                  </a:cubicBezTo>
+                  <a:cubicBezTo>
+                    <a:pt x="306307" y="398820"/>
+                    <a:pt x="286025" y="451182"/>
+                    <a:pt x="281886" y="511616"/>
+                  </a:cubicBezTo>
+                  <a:lnTo>
+                    <a:pt x="540177" y="511616"/>
+                  </a:lnTo>
+                  <a:lnTo>
+                    <a:pt x="540177" y="1013297"/>
+                  </a:lnTo>
+                  <a:lnTo>
+                    <a:pt x="0" y="1013297"/>
+                  </a:lnTo>
+                  <a:lnTo>
+                    <a:pt x="0" y="597299"/>
+                  </a:lnTo>
+                  <a:cubicBezTo>
+                    <a:pt x="0" y="444145"/>
+                    <a:pt x="31873" y="323278"/>
+                    <a:pt x="95618" y="234697"/>
+                  </a:cubicBezTo>
+                  <a:cubicBezTo>
+                    <a:pt x="159363" y="146117"/>
+                    <a:pt x="268640" y="67884"/>
+                    <a:pt x="423449" y="0"/>
+                  </a:cubicBezTo>
+                  <a:close/>
+                </a:path>
+              </a:pathLst>
+            </a:custGeom>
+            <a:grpFill/>
+            <a:ln w="25400" cap="flat" cmpd="sng" algn="ctr">
+              <a:noFill/>
+              <a:prstDash val="solid"/>
+            </a:ln>
+            <a:effectLst/>
+          </p:spPr>
+          <p:txBody>
+            <a:bodyPr rtlCol="0" anchor="ctr"/>
+            <a:lstStyle>
+              <a:defPPr>
+                <a:defRPr lang="fr-FR"/>
+              </a:defPPr>
+              <a:lvl1pPr marL="0" algn="l" defTabSz="914354" rtl="0" eaLnBrk="1" latinLnBrk="0" hangingPunct="1">
+                <a:defRPr sz="1800" kern="1200">
+                  <a:solidFill>
+                    <a:schemeClr val="lt1"/>
+                  </a:solidFill>
+                  <a:latin typeface="+mn-lt"/>
+                  <a:ea typeface="+mn-ea"/>
+                  <a:cs typeface="+mn-cs"/>
+                </a:defRPr>
+              </a:lvl1pPr>
+              <a:lvl2pPr marL="457178" algn="l" defTabSz="914354" rtl="0" eaLnBrk="1" latinLnBrk="0" hangingPunct="1">
+                <a:defRPr sz="1800" kern="1200">
+                  <a:solidFill>
+                    <a:schemeClr val="lt1"/>
+                  </a:solidFill>
+                  <a:latin typeface="+mn-lt"/>
+                  <a:ea typeface="+mn-ea"/>
+                  <a:cs typeface="+mn-cs"/>
+                </a:defRPr>
+              </a:lvl2pPr>
+              <a:lvl3pPr marL="914354" algn="l" defTabSz="914354" rtl="0" eaLnBrk="1" latinLnBrk="0" hangingPunct="1">
+                <a:defRPr sz="1800" kern="1200">
+                  <a:solidFill>
+                    <a:schemeClr val="lt1"/>
+                  </a:solidFill>
+                  <a:latin typeface="+mn-lt"/>
+                  <a:ea typeface="+mn-ea"/>
+                  <a:cs typeface="+mn-cs"/>
+                </a:defRPr>
+              </a:lvl3pPr>
+              <a:lvl4pPr marL="1371532" algn="l" defTabSz="914354" rtl="0" eaLnBrk="1" latinLnBrk="0" hangingPunct="1">
+                <a:defRPr sz="1800" kern="1200">
+                  <a:solidFill>
+                    <a:schemeClr val="lt1"/>
+                  </a:solidFill>
+                  <a:latin typeface="+mn-lt"/>
+                  <a:ea typeface="+mn-ea"/>
+                  <a:cs typeface="+mn-cs"/>
+                </a:defRPr>
+              </a:lvl4pPr>
+              <a:lvl5pPr marL="1828709" algn="l" defTabSz="914354" rtl="0" eaLnBrk="1" latinLnBrk="0" hangingPunct="1">
+                <a:defRPr sz="1800" kern="1200">
+                  <a:solidFill>
+                    <a:schemeClr val="lt1"/>
+                  </a:solidFill>
+                  <a:latin typeface="+mn-lt"/>
+                  <a:ea typeface="+mn-ea"/>
+                  <a:cs typeface="+mn-cs"/>
+                </a:defRPr>
+              </a:lvl5pPr>
+              <a:lvl6pPr marL="2285886" algn="l" defTabSz="914354" rtl="0" eaLnBrk="1" latinLnBrk="0" hangingPunct="1">
+                <a:defRPr sz="1800" kern="1200">
+                  <a:solidFill>
+                    <a:schemeClr val="lt1"/>
+                  </a:solidFill>
+                  <a:latin typeface="+mn-lt"/>
+                  <a:ea typeface="+mn-ea"/>
+                  <a:cs typeface="+mn-cs"/>
+                </a:defRPr>
+              </a:lvl6pPr>
+              <a:lvl7pPr marL="2743062" algn="l" defTabSz="914354" rtl="0" eaLnBrk="1" latinLnBrk="0" hangingPunct="1">
+                <a:defRPr sz="1800" kern="1200">
+                  <a:solidFill>
+                    <a:schemeClr val="lt1"/>
+                  </a:solidFill>
+                  <a:latin typeface="+mn-lt"/>
+                  <a:ea typeface="+mn-ea"/>
+                  <a:cs typeface="+mn-cs"/>
+                </a:defRPr>
+              </a:lvl7pPr>
+              <a:lvl8pPr marL="3200240" algn="l" defTabSz="914354" rtl="0" eaLnBrk="1" latinLnBrk="0" hangingPunct="1">
+                <a:defRPr sz="1800" kern="1200">
+                  <a:solidFill>
+                    <a:schemeClr val="lt1"/>
+                  </a:solidFill>
+                  <a:latin typeface="+mn-lt"/>
+                  <a:ea typeface="+mn-ea"/>
+                  <a:cs typeface="+mn-cs"/>
+                </a:defRPr>
+              </a:lvl8pPr>
+              <a:lvl9pPr marL="3657418" algn="l" defTabSz="914354" rtl="0" eaLnBrk="1" latinLnBrk="0" hangingPunct="1">
+                <a:defRPr sz="1800" kern="1200">
+                  <a:solidFill>
+                    <a:schemeClr val="lt1"/>
+                  </a:solidFill>
+                  <a:latin typeface="+mn-lt"/>
+                  <a:ea typeface="+mn-ea"/>
+                  <a:cs typeface="+mn-cs"/>
+                </a:defRPr>
+              </a:lvl9pPr>
+            </a:lstStyle>
+            <a:p>
+              <a:pPr marL="0" marR="0" lvl="0" indent="0" algn="ctr" defTabSz="914354" rtl="0" eaLnBrk="1" fontAlgn="auto" latinLnBrk="0" hangingPunct="1">
+                <a:lnSpc>
+                  <a:spcPct val="100000"/>
+                </a:lnSpc>
+                <a:spcBef>
+                  <a:spcPts val="0"/>
+                </a:spcBef>
+                <a:spcAft>
+                  <a:spcPts val="0"/>
+                </a:spcAft>
+                <a:buClrTx/>
+                <a:buSzTx/>
+                <a:buFontTx/>
+                <a:buNone/>
+                <a:tabLst/>
+                <a:defRPr/>
+              </a:pPr>
+              <a:endParaRPr kumimoji="0" lang="en-US" sz="1800" b="0" i="0" u="none" strike="noStrike" kern="1200" cap="none" spc="0" normalizeH="0" baseline="0" noProof="0">
+                <a:ln>
+                  <a:noFill/>
+                </a:ln>
+                <a:solidFill>
+                  <a:sysClr val="window" lastClr="FFFFFF"/>
+                </a:solidFill>
+                <a:effectLst/>
+                <a:uLnTx/>
+                <a:uFillTx/>
+                <a:latin typeface="Calibri"/>
+                <a:ea typeface="+mn-ea"/>
+                <a:cs typeface="+mn-cs"/>
+              </a:endParaRPr>
+            </a:p>
+          </p:txBody>
+        </p:sp>
+        <p:sp>
+          <p:nvSpPr>
+            <p:cNvPr id="15" name="Freeform: Shape 14">
+              <a:extLst>
+                <a:ext uri="{FF2B5EF4-FFF2-40B4-BE49-F238E27FC236}">
+                  <a16:creationId xmlns:a16="http://schemas.microsoft.com/office/drawing/2014/main" id="{0AADDD05-E61A-4A67-BEED-F02D5733803E}"/>
+                </a:ext>
+              </a:extLst>
+            </p:cNvPr>
+            <p:cNvSpPr/>
+            <p:nvPr/>
+          </p:nvSpPr>
+          <p:spPr>
+            <a:xfrm>
+              <a:off x="4990388" y="1688277"/>
+              <a:ext cx="540177" cy="1013297"/>
+            </a:xfrm>
+            <a:custGeom>
+              <a:avLst/>
+              <a:gdLst/>
+              <a:ahLst/>
+              <a:cxnLst/>
+              <a:rect l="l" t="t" r="r" b="b"/>
+              <a:pathLst>
+                <a:path w="540177" h="1013297">
+                  <a:moveTo>
+                    <a:pt x="423449" y="0"/>
+                  </a:moveTo>
+                  <a:lnTo>
+                    <a:pt x="540177" y="221038"/>
+                  </a:lnTo>
+                  <a:cubicBezTo>
+                    <a:pt x="444973" y="265742"/>
+                    <a:pt x="379158" y="310239"/>
+                    <a:pt x="342733" y="354530"/>
+                  </a:cubicBezTo>
+                  <a:cubicBezTo>
+                    <a:pt x="306307" y="398820"/>
+                    <a:pt x="286025" y="451182"/>
+                    <a:pt x="281885" y="511616"/>
+                  </a:cubicBezTo>
+                  <a:lnTo>
+                    <a:pt x="540177" y="511616"/>
+                  </a:lnTo>
+                  <a:lnTo>
+                    <a:pt x="540177" y="1013297"/>
+                  </a:lnTo>
+                  <a:lnTo>
+                    <a:pt x="0" y="1013297"/>
+                  </a:lnTo>
+                  <a:lnTo>
+                    <a:pt x="0" y="597299"/>
+                  </a:lnTo>
+                  <a:cubicBezTo>
+                    <a:pt x="0" y="444145"/>
+                    <a:pt x="31873" y="323278"/>
+                    <a:pt x="95618" y="234697"/>
+                  </a:cubicBezTo>
+                  <a:cubicBezTo>
+                    <a:pt x="159363" y="146117"/>
+                    <a:pt x="268640" y="67884"/>
+                    <a:pt x="423449" y="0"/>
+                  </a:cubicBezTo>
+                  <a:close/>
+                </a:path>
+              </a:pathLst>
+            </a:custGeom>
+            <a:grpFill/>
+            <a:ln w="25400" cap="flat" cmpd="sng" algn="ctr">
+              <a:noFill/>
+              <a:prstDash val="solid"/>
+            </a:ln>
+            <a:effectLst/>
+          </p:spPr>
+          <p:txBody>
+            <a:bodyPr rtlCol="0" anchor="ctr"/>
+            <a:lstStyle>
+              <a:defPPr>
+                <a:defRPr lang="fr-FR"/>
+              </a:defPPr>
+              <a:lvl1pPr marL="0" algn="l" defTabSz="914354" rtl="0" eaLnBrk="1" latinLnBrk="0" hangingPunct="1">
+                <a:defRPr sz="1800" kern="1200">
+                  <a:solidFill>
+                    <a:schemeClr val="lt1"/>
+                  </a:solidFill>
+                  <a:latin typeface="+mn-lt"/>
+                  <a:ea typeface="+mn-ea"/>
+                  <a:cs typeface="+mn-cs"/>
+                </a:defRPr>
+              </a:lvl1pPr>
+              <a:lvl2pPr marL="457178" algn="l" defTabSz="914354" rtl="0" eaLnBrk="1" latinLnBrk="0" hangingPunct="1">
+                <a:defRPr sz="1800" kern="1200">
+                  <a:solidFill>
+                    <a:schemeClr val="lt1"/>
+                  </a:solidFill>
+                  <a:latin typeface="+mn-lt"/>
+                  <a:ea typeface="+mn-ea"/>
+                  <a:cs typeface="+mn-cs"/>
+                </a:defRPr>
+              </a:lvl2pPr>
+              <a:lvl3pPr marL="914354" algn="l" defTabSz="914354" rtl="0" eaLnBrk="1" latinLnBrk="0" hangingPunct="1">
+                <a:defRPr sz="1800" kern="1200">
+                  <a:solidFill>
+                    <a:schemeClr val="lt1"/>
+                  </a:solidFill>
+                  <a:latin typeface="+mn-lt"/>
+                  <a:ea typeface="+mn-ea"/>
+                  <a:cs typeface="+mn-cs"/>
+                </a:defRPr>
+              </a:lvl3pPr>
+              <a:lvl4pPr marL="1371532" algn="l" defTabSz="914354" rtl="0" eaLnBrk="1" latinLnBrk="0" hangingPunct="1">
+                <a:defRPr sz="1800" kern="1200">
+                  <a:solidFill>
+                    <a:schemeClr val="lt1"/>
+                  </a:solidFill>
+                  <a:latin typeface="+mn-lt"/>
+                  <a:ea typeface="+mn-ea"/>
+                  <a:cs typeface="+mn-cs"/>
+                </a:defRPr>
+              </a:lvl4pPr>
+              <a:lvl5pPr marL="1828709" algn="l" defTabSz="914354" rtl="0" eaLnBrk="1" latinLnBrk="0" hangingPunct="1">
+                <a:defRPr sz="1800" kern="1200">
+                  <a:solidFill>
+                    <a:schemeClr val="lt1"/>
+                  </a:solidFill>
+                  <a:latin typeface="+mn-lt"/>
+                  <a:ea typeface="+mn-ea"/>
+                  <a:cs typeface="+mn-cs"/>
+                </a:defRPr>
+              </a:lvl5pPr>
+              <a:lvl6pPr marL="2285886" algn="l" defTabSz="914354" rtl="0" eaLnBrk="1" latinLnBrk="0" hangingPunct="1">
+                <a:defRPr sz="1800" kern="1200">
+                  <a:solidFill>
+                    <a:schemeClr val="lt1"/>
+                  </a:solidFill>
+                  <a:latin typeface="+mn-lt"/>
+                  <a:ea typeface="+mn-ea"/>
+                  <a:cs typeface="+mn-cs"/>
+                </a:defRPr>
+              </a:lvl6pPr>
+              <a:lvl7pPr marL="2743062" algn="l" defTabSz="914354" rtl="0" eaLnBrk="1" latinLnBrk="0" hangingPunct="1">
+                <a:defRPr sz="1800" kern="1200">
+                  <a:solidFill>
+                    <a:schemeClr val="lt1"/>
+                  </a:solidFill>
+                  <a:latin typeface="+mn-lt"/>
+                  <a:ea typeface="+mn-ea"/>
+                  <a:cs typeface="+mn-cs"/>
+                </a:defRPr>
+              </a:lvl7pPr>
+              <a:lvl8pPr marL="3200240" algn="l" defTabSz="914354" rtl="0" eaLnBrk="1" latinLnBrk="0" hangingPunct="1">
+                <a:defRPr sz="1800" kern="1200">
+                  <a:solidFill>
+                    <a:schemeClr val="lt1"/>
+                  </a:solidFill>
+                  <a:latin typeface="+mn-lt"/>
+                  <a:ea typeface="+mn-ea"/>
+                  <a:cs typeface="+mn-cs"/>
+                </a:defRPr>
+              </a:lvl8pPr>
+              <a:lvl9pPr marL="3657418" algn="l" defTabSz="914354" rtl="0" eaLnBrk="1" latinLnBrk="0" hangingPunct="1">
+                <a:defRPr sz="1800" kern="1200">
+                  <a:solidFill>
+                    <a:schemeClr val="lt1"/>
+                  </a:solidFill>
+                  <a:latin typeface="+mn-lt"/>
+                  <a:ea typeface="+mn-ea"/>
+                  <a:cs typeface="+mn-cs"/>
+                </a:defRPr>
+              </a:lvl9pPr>
+            </a:lstStyle>
+            <a:p>
+              <a:pPr marL="0" marR="0" lvl="0" indent="0" algn="ctr" defTabSz="914354" rtl="0" eaLnBrk="1" fontAlgn="auto" latinLnBrk="0" hangingPunct="1">
+                <a:lnSpc>
+                  <a:spcPct val="100000"/>
+                </a:lnSpc>
+                <a:spcBef>
+                  <a:spcPts val="0"/>
+                </a:spcBef>
+                <a:spcAft>
+                  <a:spcPts val="0"/>
+                </a:spcAft>
+                <a:buClrTx/>
+                <a:buSzTx/>
+                <a:buFontTx/>
+                <a:buNone/>
+                <a:tabLst/>
+                <a:defRPr/>
+              </a:pPr>
+              <a:endParaRPr kumimoji="0" lang="en-US" sz="1800" b="0" i="0" u="none" strike="noStrike" kern="1200" cap="none" spc="0" normalizeH="0" baseline="0" noProof="0">
+                <a:ln>
+                  <a:noFill/>
+                </a:ln>
+                <a:solidFill>
+                  <a:sysClr val="window" lastClr="FFFFFF"/>
+                </a:solidFill>
+                <a:effectLst/>
+                <a:uLnTx/>
+                <a:uFillTx/>
+                <a:latin typeface="Calibri"/>
+                <a:ea typeface="+mn-ea"/>
+                <a:cs typeface="+mn-cs"/>
+              </a:endParaRPr>
+            </a:p>
+          </p:txBody>
+        </p:sp>
+      </p:grpSp>
     </p:spTree>
     <p:extLst>
       <p:ext uri="{BB962C8B-B14F-4D97-AF65-F5344CB8AC3E}">
@@ -14757,6 +15522,362 @@
   <p:clrMapOvr>
     <a:masterClrMapping/>
   </p:clrMapOvr>
+  <p:timing>
+    <p:tnLst>
+      <p:par>
+        <p:cTn id="1" dur="indefinite" restart="never" nodeType="tmRoot">
+          <p:childTnLst>
+            <p:seq concurrent="1" nextAc="seek">
+              <p:cTn id="2" dur="indefinite" nodeType="mainSeq">
+                <p:childTnLst>
+                  <p:par>
+                    <p:cTn id="3" fill="hold">
+                      <p:stCondLst>
+                        <p:cond delay="indefinite"/>
+                      </p:stCondLst>
+                      <p:childTnLst>
+                        <p:par>
+                          <p:cTn id="4" fill="hold">
+                            <p:stCondLst>
+                              <p:cond delay="0"/>
+                            </p:stCondLst>
+                            <p:childTnLst>
+                              <p:par>
+                                <p:cTn id="5" presetID="10" presetClass="entr" presetSubtype="0" fill="hold" nodeType="clickEffect">
+                                  <p:stCondLst>
+                                    <p:cond delay="0"/>
+                                  </p:stCondLst>
+                                  <p:childTnLst>
+                                    <p:set>
+                                      <p:cBhvr>
+                                        <p:cTn id="6" dur="1" fill="hold">
+                                          <p:stCondLst>
+                                            <p:cond delay="0"/>
+                                          </p:stCondLst>
+                                        </p:cTn>
+                                        <p:tgtEl>
+                                          <p:spTgt spid="13"/>
+                                        </p:tgtEl>
+                                        <p:attrNameLst>
+                                          <p:attrName>style.visibility</p:attrName>
+                                        </p:attrNameLst>
+                                      </p:cBhvr>
+                                      <p:to>
+                                        <p:strVal val="visible"/>
+                                      </p:to>
+                                    </p:set>
+                                    <p:animEffect transition="in" filter="fade">
+                                      <p:cBhvr>
+                                        <p:cTn id="7" dur="500"/>
+                                        <p:tgtEl>
+                                          <p:spTgt spid="13"/>
+                                        </p:tgtEl>
+                                      </p:cBhvr>
+                                    </p:animEffect>
+                                  </p:childTnLst>
+                                </p:cTn>
+                              </p:par>
+                              <p:par>
+                                <p:cTn id="8" presetID="10" presetClass="entr" presetSubtype="0" fill="hold" grpId="0" nodeType="withEffect">
+                                  <p:stCondLst>
+                                    <p:cond delay="0"/>
+                                  </p:stCondLst>
+                                  <p:childTnLst>
+                                    <p:set>
+                                      <p:cBhvr>
+                                        <p:cTn id="9" dur="1" fill="hold">
+                                          <p:stCondLst>
+                                            <p:cond delay="0"/>
+                                          </p:stCondLst>
+                                        </p:cTn>
+                                        <p:tgtEl>
+                                          <p:spTgt spid="12"/>
+                                        </p:tgtEl>
+                                        <p:attrNameLst>
+                                          <p:attrName>style.visibility</p:attrName>
+                                        </p:attrNameLst>
+                                      </p:cBhvr>
+                                      <p:to>
+                                        <p:strVal val="visible"/>
+                                      </p:to>
+                                    </p:set>
+                                    <p:animEffect transition="in" filter="fade">
+                                      <p:cBhvr>
+                                        <p:cTn id="10" dur="500"/>
+                                        <p:tgtEl>
+                                          <p:spTgt spid="12"/>
+                                        </p:tgtEl>
+                                      </p:cBhvr>
+                                    </p:animEffect>
+                                  </p:childTnLst>
+                                </p:cTn>
+                              </p:par>
+                              <p:par>
+                                <p:cTn id="11" presetID="10" presetClass="entr" presetSubtype="0" fill="hold" nodeType="withEffect">
+                                  <p:stCondLst>
+                                    <p:cond delay="0"/>
+                                  </p:stCondLst>
+                                  <p:childTnLst>
+                                    <p:set>
+                                      <p:cBhvr>
+                                        <p:cTn id="12" dur="1" fill="hold">
+                                          <p:stCondLst>
+                                            <p:cond delay="0"/>
+                                          </p:stCondLst>
+                                        </p:cTn>
+                                        <p:tgtEl>
+                                          <p:spTgt spid="1026"/>
+                                        </p:tgtEl>
+                                        <p:attrNameLst>
+                                          <p:attrName>style.visibility</p:attrName>
+                                        </p:attrNameLst>
+                                      </p:cBhvr>
+                                      <p:to>
+                                        <p:strVal val="visible"/>
+                                      </p:to>
+                                    </p:set>
+                                    <p:animEffect transition="in" filter="fade">
+                                      <p:cBhvr>
+                                        <p:cTn id="13" dur="500"/>
+                                        <p:tgtEl>
+                                          <p:spTgt spid="1026"/>
+                                        </p:tgtEl>
+                                      </p:cBhvr>
+                                    </p:animEffect>
+                                  </p:childTnLst>
+                                </p:cTn>
+                              </p:par>
+                            </p:childTnLst>
+                          </p:cTn>
+                        </p:par>
+                      </p:childTnLst>
+                    </p:cTn>
+                  </p:par>
+                  <p:par>
+                    <p:cTn id="14" fill="hold">
+                      <p:stCondLst>
+                        <p:cond delay="indefinite"/>
+                      </p:stCondLst>
+                      <p:childTnLst>
+                        <p:par>
+                          <p:cTn id="15" fill="hold">
+                            <p:stCondLst>
+                              <p:cond delay="0"/>
+                            </p:stCondLst>
+                            <p:childTnLst>
+                              <p:par>
+                                <p:cTn id="16" presetID="10" presetClass="entr" presetSubtype="0" fill="hold" grpId="0" nodeType="clickEffect">
+                                  <p:stCondLst>
+                                    <p:cond delay="0"/>
+                                  </p:stCondLst>
+                                  <p:childTnLst>
+                                    <p:set>
+                                      <p:cBhvr>
+                                        <p:cTn id="17" dur="1" fill="hold">
+                                          <p:stCondLst>
+                                            <p:cond delay="0"/>
+                                          </p:stCondLst>
+                                        </p:cTn>
+                                        <p:tgtEl>
+                                          <p:spTgt spid="5"/>
+                                        </p:tgtEl>
+                                        <p:attrNameLst>
+                                          <p:attrName>style.visibility</p:attrName>
+                                        </p:attrNameLst>
+                                      </p:cBhvr>
+                                      <p:to>
+                                        <p:strVal val="visible"/>
+                                      </p:to>
+                                    </p:set>
+                                    <p:animEffect transition="in" filter="fade">
+                                      <p:cBhvr>
+                                        <p:cTn id="18" dur="500"/>
+                                        <p:tgtEl>
+                                          <p:spTgt spid="5"/>
+                                        </p:tgtEl>
+                                      </p:cBhvr>
+                                    </p:animEffect>
+                                  </p:childTnLst>
+                                </p:cTn>
+                              </p:par>
+                              <p:par>
+                                <p:cTn id="19" presetID="10" presetClass="entr" presetSubtype="0" fill="hold" grpId="0" nodeType="withEffect">
+                                  <p:stCondLst>
+                                    <p:cond delay="0"/>
+                                  </p:stCondLst>
+                                  <p:childTnLst>
+                                    <p:set>
+                                      <p:cBhvr>
+                                        <p:cTn id="20" dur="1" fill="hold">
+                                          <p:stCondLst>
+                                            <p:cond delay="0"/>
+                                          </p:stCondLst>
+                                        </p:cTn>
+                                        <p:tgtEl>
+                                          <p:spTgt spid="6"/>
+                                        </p:tgtEl>
+                                        <p:attrNameLst>
+                                          <p:attrName>style.visibility</p:attrName>
+                                        </p:attrNameLst>
+                                      </p:cBhvr>
+                                      <p:to>
+                                        <p:strVal val="visible"/>
+                                      </p:to>
+                                    </p:set>
+                                    <p:animEffect transition="in" filter="fade">
+                                      <p:cBhvr>
+                                        <p:cTn id="21" dur="500"/>
+                                        <p:tgtEl>
+                                          <p:spTgt spid="6"/>
+                                        </p:tgtEl>
+                                      </p:cBhvr>
+                                    </p:animEffect>
+                                  </p:childTnLst>
+                                </p:cTn>
+                              </p:par>
+                              <p:par>
+                                <p:cTn id="22" presetID="10" presetClass="entr" presetSubtype="0" fill="hold" grpId="0" nodeType="withEffect">
+                                  <p:stCondLst>
+                                    <p:cond delay="0"/>
+                                  </p:stCondLst>
+                                  <p:childTnLst>
+                                    <p:set>
+                                      <p:cBhvr>
+                                        <p:cTn id="23" dur="1" fill="hold">
+                                          <p:stCondLst>
+                                            <p:cond delay="0"/>
+                                          </p:stCondLst>
+                                        </p:cTn>
+                                        <p:tgtEl>
+                                          <p:spTgt spid="3"/>
+                                        </p:tgtEl>
+                                        <p:attrNameLst>
+                                          <p:attrName>style.visibility</p:attrName>
+                                        </p:attrNameLst>
+                                      </p:cBhvr>
+                                      <p:to>
+                                        <p:strVal val="visible"/>
+                                      </p:to>
+                                    </p:set>
+                                    <p:animEffect transition="in" filter="fade">
+                                      <p:cBhvr>
+                                        <p:cTn id="24" dur="500"/>
+                                        <p:tgtEl>
+                                          <p:spTgt spid="3"/>
+                                        </p:tgtEl>
+                                      </p:cBhvr>
+                                    </p:animEffect>
+                                  </p:childTnLst>
+                                </p:cTn>
+                              </p:par>
+                              <p:par>
+                                <p:cTn id="25" presetID="10" presetClass="entr" presetSubtype="0" fill="hold" grpId="0" nodeType="withEffect">
+                                  <p:stCondLst>
+                                    <p:cond delay="0"/>
+                                  </p:stCondLst>
+                                  <p:childTnLst>
+                                    <p:set>
+                                      <p:cBhvr>
+                                        <p:cTn id="26" dur="1" fill="hold">
+                                          <p:stCondLst>
+                                            <p:cond delay="0"/>
+                                          </p:stCondLst>
+                                        </p:cTn>
+                                        <p:tgtEl>
+                                          <p:spTgt spid="4"/>
+                                        </p:tgtEl>
+                                        <p:attrNameLst>
+                                          <p:attrName>style.visibility</p:attrName>
+                                        </p:attrNameLst>
+                                      </p:cBhvr>
+                                      <p:to>
+                                        <p:strVal val="visible"/>
+                                      </p:to>
+                                    </p:set>
+                                    <p:animEffect transition="in" filter="fade">
+                                      <p:cBhvr>
+                                        <p:cTn id="27" dur="500"/>
+                                        <p:tgtEl>
+                                          <p:spTgt spid="4"/>
+                                        </p:tgtEl>
+                                      </p:cBhvr>
+                                    </p:animEffect>
+                                  </p:childTnLst>
+                                </p:cTn>
+                              </p:par>
+                              <p:par>
+                                <p:cTn id="28" presetID="10" presetClass="entr" presetSubtype="0" fill="hold" grpId="0" nodeType="withEffect">
+                                  <p:stCondLst>
+                                    <p:cond delay="0"/>
+                                  </p:stCondLst>
+                                  <p:childTnLst>
+                                    <p:set>
+                                      <p:cBhvr>
+                                        <p:cTn id="29" dur="1" fill="hold">
+                                          <p:stCondLst>
+                                            <p:cond delay="0"/>
+                                          </p:stCondLst>
+                                        </p:cTn>
+                                        <p:tgtEl>
+                                          <p:spTgt spid="7"/>
+                                        </p:tgtEl>
+                                        <p:attrNameLst>
+                                          <p:attrName>style.visibility</p:attrName>
+                                        </p:attrNameLst>
+                                      </p:cBhvr>
+                                      <p:to>
+                                        <p:strVal val="visible"/>
+                                      </p:to>
+                                    </p:set>
+                                    <p:animEffect transition="in" filter="fade">
+                                      <p:cBhvr>
+                                        <p:cTn id="30" dur="500"/>
+                                        <p:tgtEl>
+                                          <p:spTgt spid="7"/>
+                                        </p:tgtEl>
+                                      </p:cBhvr>
+                                    </p:animEffect>
+                                  </p:childTnLst>
+                                </p:cTn>
+                              </p:par>
+                            </p:childTnLst>
+                          </p:cTn>
+                        </p:par>
+                      </p:childTnLst>
+                    </p:cTn>
+                  </p:par>
+                </p:childTnLst>
+              </p:cTn>
+              <p:prevCondLst>
+                <p:cond evt="onPrev" delay="0">
+                  <p:tgtEl>
+                    <p:sldTgt/>
+                  </p:tgtEl>
+                </p:cond>
+              </p:prevCondLst>
+              <p:nextCondLst>
+                <p:cond evt="onNext" delay="0">
+                  <p:tgtEl>
+                    <p:sldTgt/>
+                  </p:tgtEl>
+                </p:cond>
+              </p:nextCondLst>
+            </p:seq>
+          </p:childTnLst>
+        </p:cTn>
+      </p:par>
+    </p:tnLst>
+    <p:bldLst>
+      <p:bldGraphic spid="4" grpId="0">
+        <p:bldAsOne/>
+      </p:bldGraphic>
+      <p:bldP spid="3" grpId="0"/>
+      <p:bldP spid="5" grpId="0"/>
+      <p:bldP spid="6" grpId="0"/>
+      <p:bldP spid="7" grpId="0"/>
+      <p:bldP spid="12" grpId="0"/>
+    </p:bldLst>
+  </p:timing>
 </p:sld>
 </file>
 

</xml_diff>